<commit_message>
about and instruction page updated
</commit_message>
<xml_diff>
--- a/assets/screens/screens.pptx
+++ b/assets/screens/screens.pptx
@@ -208,7 +208,7 @@
           <a:p>
             <a:fld id="{944FAE53-B8F5-4659-82E9-F5704569BA63}" type="datetimeFigureOut">
               <a:rPr lang="en-US" smtClean="0"/>
-              <a:t>8/5/2023</a:t>
+              <a:t>8/7/2023</a:t>
             </a:fld>
             <a:endParaRPr lang="en-US"/>
           </a:p>
@@ -759,7 +759,7 @@
           <a:p>
             <a:fld id="{999A8DD2-C443-44AD-85B3-4CE72B962C5F}" type="datetimeFigureOut">
               <a:rPr lang="en-US" smtClean="0"/>
-              <a:t>8/5/2023</a:t>
+              <a:t>8/7/2023</a:t>
             </a:fld>
             <a:endParaRPr lang="en-US"/>
           </a:p>
@@ -949,7 +949,7 @@
           <a:p>
             <a:fld id="{999A8DD2-C443-44AD-85B3-4CE72B962C5F}" type="datetimeFigureOut">
               <a:rPr lang="en-US" smtClean="0"/>
-              <a:t>8/5/2023</a:t>
+              <a:t>8/7/2023</a:t>
             </a:fld>
             <a:endParaRPr lang="en-US"/>
           </a:p>
@@ -1129,7 +1129,7 @@
           <a:p>
             <a:fld id="{999A8DD2-C443-44AD-85B3-4CE72B962C5F}" type="datetimeFigureOut">
               <a:rPr lang="en-US" smtClean="0"/>
-              <a:t>8/5/2023</a:t>
+              <a:t>8/7/2023</a:t>
             </a:fld>
             <a:endParaRPr lang="en-US"/>
           </a:p>
@@ -1299,7 +1299,7 @@
           <a:p>
             <a:fld id="{999A8DD2-C443-44AD-85B3-4CE72B962C5F}" type="datetimeFigureOut">
               <a:rPr lang="en-US" smtClean="0"/>
-              <a:t>8/5/2023</a:t>
+              <a:t>8/7/2023</a:t>
             </a:fld>
             <a:endParaRPr lang="en-US"/>
           </a:p>
@@ -1555,7 +1555,7 @@
           <a:p>
             <a:fld id="{999A8DD2-C443-44AD-85B3-4CE72B962C5F}" type="datetimeFigureOut">
               <a:rPr lang="en-US" smtClean="0"/>
-              <a:t>8/5/2023</a:t>
+              <a:t>8/7/2023</a:t>
             </a:fld>
             <a:endParaRPr lang="en-US"/>
           </a:p>
@@ -1843,7 +1843,7 @@
           <a:p>
             <a:fld id="{999A8DD2-C443-44AD-85B3-4CE72B962C5F}" type="datetimeFigureOut">
               <a:rPr lang="en-US" smtClean="0"/>
-              <a:t>8/5/2023</a:t>
+              <a:t>8/7/2023</a:t>
             </a:fld>
             <a:endParaRPr lang="en-US"/>
           </a:p>
@@ -2281,7 +2281,7 @@
           <a:p>
             <a:fld id="{999A8DD2-C443-44AD-85B3-4CE72B962C5F}" type="datetimeFigureOut">
               <a:rPr lang="en-US" smtClean="0"/>
-              <a:t>8/5/2023</a:t>
+              <a:t>8/7/2023</a:t>
             </a:fld>
             <a:endParaRPr lang="en-US"/>
           </a:p>
@@ -2399,7 +2399,7 @@
           <a:p>
             <a:fld id="{999A8DD2-C443-44AD-85B3-4CE72B962C5F}" type="datetimeFigureOut">
               <a:rPr lang="en-US" smtClean="0"/>
-              <a:t>8/5/2023</a:t>
+              <a:t>8/7/2023</a:t>
             </a:fld>
             <a:endParaRPr lang="en-US"/>
           </a:p>
@@ -2494,7 +2494,7 @@
           <a:p>
             <a:fld id="{999A8DD2-C443-44AD-85B3-4CE72B962C5F}" type="datetimeFigureOut">
               <a:rPr lang="en-US" smtClean="0"/>
-              <a:t>8/5/2023</a:t>
+              <a:t>8/7/2023</a:t>
             </a:fld>
             <a:endParaRPr lang="en-US"/>
           </a:p>
@@ -2850,7 +2850,7 @@
           <a:p>
             <a:fld id="{999A8DD2-C443-44AD-85B3-4CE72B962C5F}" type="datetimeFigureOut">
               <a:rPr lang="en-US" smtClean="0"/>
-              <a:t>8/5/2023</a:t>
+              <a:t>8/7/2023</a:t>
             </a:fld>
             <a:endParaRPr lang="en-US"/>
           </a:p>
@@ -3166,7 +3166,7 @@
           <a:p>
             <a:fld id="{999A8DD2-C443-44AD-85B3-4CE72B962C5F}" type="datetimeFigureOut">
               <a:rPr lang="en-US" smtClean="0"/>
-              <a:t>8/5/2023</a:t>
+              <a:t>8/7/2023</a:t>
             </a:fld>
             <a:endParaRPr lang="en-US"/>
           </a:p>
@@ -3399,7 +3399,7 @@
           <a:p>
             <a:fld id="{999A8DD2-C443-44AD-85B3-4CE72B962C5F}" type="datetimeFigureOut">
               <a:rPr lang="en-US" smtClean="0"/>
-              <a:t>8/5/2023</a:t>
+              <a:t>8/7/2023</a:t>
             </a:fld>
             <a:endParaRPr lang="en-US"/>
           </a:p>
@@ -11104,10 +11104,10 @@
       </p:grpSpPr>
       <p:pic>
         <p:nvPicPr>
-          <p:cNvPr id="4" name="Picture 3" descr="A space ship in space&#10;&#10;Description automatically generated">
+          <p:cNvPr id="24" name="Picture 23" descr="Two astronauts in space suits&#10;&#10;Description automatically generated">
             <a:extLst>
               <a:ext uri="{FF2B5EF4-FFF2-40B4-BE49-F238E27FC236}">
-                <a16:creationId xmlns:a16="http://schemas.microsoft.com/office/drawing/2014/main" id="{FBB31E85-F4C4-0565-D072-B4270E128816}"/>
+                <a16:creationId xmlns:a16="http://schemas.microsoft.com/office/drawing/2014/main" id="{35676153-04EF-5009-545C-9DE471D3C4A5}"/>
               </a:ext>
             </a:extLst>
           </p:cNvPr>
@@ -11116,7 +11116,7 @@
           </p:cNvPicPr>
           <p:nvPr/>
         </p:nvPicPr>
-        <p:blipFill rotWithShape="1">
+        <p:blipFill>
           <a:blip r:embed="rId2">
             <a:extLst>
               <a:ext uri="{28A0092B-C50C-407E-A947-70E740481C1C}">
@@ -11124,13 +11124,14 @@
               </a:ext>
             </a:extLst>
           </a:blip>
-          <a:srcRect r="8335" b="8252"/>
-          <a:stretch/>
+          <a:stretch>
+            <a:fillRect/>
+          </a:stretch>
         </p:blipFill>
         <p:spPr>
           <a:xfrm>
-            <a:off x="-1" y="1"/>
-            <a:ext cx="12188953" cy="6858000"/>
+            <a:off x="0" y="0"/>
+            <a:ext cx="12192000" cy="6858000"/>
           </a:xfrm>
           <a:prstGeom prst="rect">
             <a:avLst/>
@@ -11139,55 +11140,175 @@
       </p:pic>
       <p:sp>
         <p:nvSpPr>
-          <p:cNvPr id="2" name="Rectangle 1">
+          <p:cNvPr id="25" name="TextBox 24">
             <a:extLst>
               <a:ext uri="{FF2B5EF4-FFF2-40B4-BE49-F238E27FC236}">
-                <a16:creationId xmlns:a16="http://schemas.microsoft.com/office/drawing/2014/main" id="{9E8CBEDD-41EE-EFB7-135F-9E9B9FBD7714}"/>
+                <a16:creationId xmlns:a16="http://schemas.microsoft.com/office/drawing/2014/main" id="{0AB961F5-A9EB-920C-7A7E-5F163F4EE9DA}"/>
               </a:ext>
             </a:extLst>
           </p:cNvPr>
-          <p:cNvSpPr/>
+          <p:cNvSpPr txBox="1"/>
           <p:nvPr/>
         </p:nvSpPr>
         <p:spPr>
           <a:xfrm>
-            <a:off x="-3048" y="0"/>
-            <a:ext cx="12192000" cy="6859715"/>
+            <a:off x="0" y="5139367"/>
+            <a:ext cx="2841674" cy="1600438"/>
           </a:xfrm>
           <a:prstGeom prst="rect">
             <a:avLst/>
           </a:prstGeom>
-          <a:solidFill>
-            <a:schemeClr val="tx1">
-              <a:alpha val="35000"/>
-            </a:schemeClr>
-          </a:solidFill>
-          <a:ln>
-            <a:noFill/>
-          </a:ln>
+          <a:noFill/>
         </p:spPr>
-        <p:style>
-          <a:lnRef idx="2">
-            <a:schemeClr val="accent1">
-              <a:shade val="15000"/>
-            </a:schemeClr>
-          </a:lnRef>
-          <a:fillRef idx="1">
-            <a:schemeClr val="accent1"/>
-          </a:fillRef>
-          <a:effectRef idx="0">
-            <a:schemeClr val="accent1"/>
-          </a:effectRef>
-          <a:fontRef idx="minor">
-            <a:schemeClr val="lt1"/>
-          </a:fontRef>
-        </p:style>
         <p:txBody>
-          <a:bodyPr rtlCol="0" anchor="ctr"/>
+          <a:bodyPr wrap="square" rtlCol="0">
+            <a:spAutoFit/>
+          </a:bodyPr>
           <a:lstStyle/>
           <a:p>
-            <a:pPr algn="ctr"/>
-            <a:endParaRPr lang="en-US" dirty="0"/>
+            <a:pPr algn="r"/>
+            <a:r>
+              <a:rPr lang="en-US" sz="3200" dirty="0">
+                <a:solidFill>
+                  <a:schemeClr val="bg1"/>
+                </a:solidFill>
+                <a:latin typeface="Quantum" pitchFamily="50" charset="0"/>
+              </a:rPr>
+              <a:t>SHAEAKH</a:t>
+            </a:r>
+            <a:endParaRPr lang="en-US" sz="2000" dirty="0">
+              <a:solidFill>
+                <a:schemeClr val="bg1"/>
+              </a:solidFill>
+              <a:latin typeface="Quantum" pitchFamily="50" charset="0"/>
+            </a:endParaRPr>
+          </a:p>
+          <a:p>
+            <a:pPr algn="r"/>
+            <a:r>
+              <a:rPr lang="en-US" sz="1400" dirty="0">
+                <a:solidFill>
+                  <a:schemeClr val="bg1"/>
+                </a:solidFill>
+                <a:latin typeface="Quantum" pitchFamily="50" charset="0"/>
+              </a:rPr>
+              <a:t>AHMED CHOWDHURY</a:t>
+            </a:r>
+          </a:p>
+          <a:p>
+            <a:pPr algn="r"/>
+            <a:r>
+              <a:rPr lang="en-US" sz="3200" dirty="0">
+                <a:solidFill>
+                  <a:schemeClr val="bg1"/>
+                </a:solidFill>
+                <a:latin typeface="Quantum" pitchFamily="50" charset="0"/>
+              </a:rPr>
+              <a:t>2020831022</a:t>
+            </a:r>
+            <a:endParaRPr lang="en-US" sz="2000" dirty="0">
+              <a:solidFill>
+                <a:schemeClr val="bg1"/>
+              </a:solidFill>
+              <a:latin typeface="Quantum" pitchFamily="50" charset="0"/>
+            </a:endParaRPr>
+          </a:p>
+          <a:p>
+            <a:pPr algn="r"/>
+            <a:r>
+              <a:rPr lang="en-US" sz="2000" dirty="0">
+                <a:solidFill>
+                  <a:schemeClr val="bg1"/>
+                </a:solidFill>
+                <a:latin typeface="Quantum" pitchFamily="50" charset="0"/>
+              </a:rPr>
+              <a:t>SWE  IICT  SUST</a:t>
+            </a:r>
+          </a:p>
+        </p:txBody>
+      </p:sp>
+      <p:sp>
+        <p:nvSpPr>
+          <p:cNvPr id="26" name="TextBox 25">
+            <a:extLst>
+              <a:ext uri="{FF2B5EF4-FFF2-40B4-BE49-F238E27FC236}">
+                <a16:creationId xmlns:a16="http://schemas.microsoft.com/office/drawing/2014/main" id="{041B907F-B6E2-FA05-3A1A-8003255A3EA0}"/>
+              </a:ext>
+            </a:extLst>
+          </p:cNvPr>
+          <p:cNvSpPr txBox="1"/>
+          <p:nvPr/>
+        </p:nvSpPr>
+        <p:spPr>
+          <a:xfrm>
+            <a:off x="9350326" y="5139367"/>
+            <a:ext cx="2841674" cy="1631216"/>
+          </a:xfrm>
+          <a:prstGeom prst="rect">
+            <a:avLst/>
+          </a:prstGeom>
+          <a:noFill/>
+        </p:spPr>
+        <p:txBody>
+          <a:bodyPr wrap="square" rtlCol="0">
+            <a:spAutoFit/>
+          </a:bodyPr>
+          <a:lstStyle/>
+          <a:p>
+            <a:r>
+              <a:rPr lang="en-US" sz="3200" dirty="0">
+                <a:solidFill>
+                  <a:schemeClr val="bg1"/>
+                </a:solidFill>
+                <a:latin typeface="Quantum" pitchFamily="50" charset="0"/>
+              </a:rPr>
+              <a:t>NIXON</a:t>
+            </a:r>
+            <a:endParaRPr lang="en-US" sz="2000" dirty="0">
+              <a:solidFill>
+                <a:schemeClr val="bg1"/>
+              </a:solidFill>
+              <a:latin typeface="Quantum" pitchFamily="50" charset="0"/>
+            </a:endParaRPr>
+          </a:p>
+          <a:p>
+            <a:r>
+              <a:rPr lang="en-US" sz="1600" dirty="0">
+                <a:solidFill>
+                  <a:schemeClr val="bg1"/>
+                </a:solidFill>
+                <a:latin typeface="Quantum" pitchFamily="50" charset="0"/>
+              </a:rPr>
+              <a:t>DEB ANTU</a:t>
+            </a:r>
+          </a:p>
+          <a:p>
+            <a:r>
+              <a:rPr lang="en-US" sz="3200" dirty="0">
+                <a:solidFill>
+                  <a:schemeClr val="bg1"/>
+                </a:solidFill>
+                <a:latin typeface="Quantum" pitchFamily="50" charset="0"/>
+              </a:rPr>
+              <a:t>2020831023</a:t>
+            </a:r>
+            <a:endParaRPr lang="en-US" sz="2000" dirty="0">
+              <a:solidFill>
+                <a:schemeClr val="bg1"/>
+              </a:solidFill>
+              <a:latin typeface="Quantum" pitchFamily="50" charset="0"/>
+            </a:endParaRPr>
+          </a:p>
+          <a:p>
+            <a:r>
+              <a:rPr lang="en-US" sz="2000" dirty="0">
+                <a:solidFill>
+                  <a:schemeClr val="bg1"/>
+                </a:solidFill>
+                <a:latin typeface="Quantum" pitchFamily="50" charset="0"/>
+              </a:rPr>
+              <a:t>SWE  IICT  SUST</a:t>
+            </a:r>
           </a:p>
         </p:txBody>
       </p:sp>
@@ -12215,6 +12336,53 @@
           </p:txBody>
         </p:sp>
       </p:grpSp>
+      <p:pic>
+        <p:nvPicPr>
+          <p:cNvPr id="2" name="Picture 4" descr="avatars.githubusercontent.com/u/509841?s=280&amp;v=4">
+            <a:extLst>
+              <a:ext uri="{FF2B5EF4-FFF2-40B4-BE49-F238E27FC236}">
+                <a16:creationId xmlns:a16="http://schemas.microsoft.com/office/drawing/2014/main" id="{5285B994-1BB9-31ED-2A87-866E99F583FC}"/>
+              </a:ext>
+            </a:extLst>
+          </p:cNvPr>
+          <p:cNvPicPr>
+            <a:picLocks noChangeAspect="1" noChangeArrowheads="1"/>
+          </p:cNvPicPr>
+          <p:nvPr/>
+        </p:nvPicPr>
+        <p:blipFill>
+          <a:blip r:embed="rId4">
+            <a:extLst>
+              <a:ext uri="{28A0092B-C50C-407E-A947-70E740481C1C}">
+                <a14:useLocalDpi xmlns:a14="http://schemas.microsoft.com/office/drawing/2010/main" val="0"/>
+              </a:ext>
+            </a:extLst>
+          </a:blip>
+          <a:srcRect/>
+          <a:stretch>
+            <a:fillRect/>
+          </a:stretch>
+        </p:blipFill>
+        <p:spPr bwMode="auto">
+          <a:xfrm>
+            <a:off x="11380070" y="277645"/>
+            <a:ext cx="555893" cy="555893"/>
+          </a:xfrm>
+          <a:prstGeom prst="rect">
+            <a:avLst/>
+          </a:prstGeom>
+          <a:noFill/>
+          <a:extLst>
+            <a:ext uri="{909E8E84-426E-40DD-AFC4-6F175D3DCCD1}">
+              <a14:hiddenFill xmlns:a14="http://schemas.microsoft.com/office/drawing/2010/main">
+                <a:solidFill>
+                  <a:srgbClr val="FFFFFF"/>
+                </a:solidFill>
+              </a14:hiddenFill>
+            </a:ext>
+          </a:extLst>
+        </p:spPr>
+      </p:pic>
     </p:spTree>
     <p:extLst>
       <p:ext uri="{BB962C8B-B14F-4D97-AF65-F5344CB8AC3E}">

</xml_diff>